<commit_message>
Revamped to include more checks
</commit_message>
<xml_diff>
--- a/Outlook Safety Check.pptx
+++ b/Outlook Safety Check.pptx
@@ -273,7 +273,7 @@
           <a:p>
             <a:fld id="{68C76F78-8F9A-44AD-9F58-46EB1BE74AE2}" type="datetimeFigureOut">
               <a:rPr lang="en-US" smtClean="0"/>
-              <a:t>9/17/2018</a:t>
+              <a:t>1/10/2022</a:t>
             </a:fld>
             <a:endParaRPr lang="en-US"/>
           </a:p>
@@ -471,7 +471,7 @@
           <a:p>
             <a:fld id="{68C76F78-8F9A-44AD-9F58-46EB1BE74AE2}" type="datetimeFigureOut">
               <a:rPr lang="en-US" smtClean="0"/>
-              <a:t>9/17/2018</a:t>
+              <a:t>1/10/2022</a:t>
             </a:fld>
             <a:endParaRPr lang="en-US"/>
           </a:p>
@@ -679,7 +679,7 @@
           <a:p>
             <a:fld id="{68C76F78-8F9A-44AD-9F58-46EB1BE74AE2}" type="datetimeFigureOut">
               <a:rPr lang="en-US" smtClean="0"/>
-              <a:t>9/17/2018</a:t>
+              <a:t>1/10/2022</a:t>
             </a:fld>
             <a:endParaRPr lang="en-US"/>
           </a:p>
@@ -877,7 +877,7 @@
           <a:p>
             <a:fld id="{68C76F78-8F9A-44AD-9F58-46EB1BE74AE2}" type="datetimeFigureOut">
               <a:rPr lang="en-US" smtClean="0"/>
-              <a:t>9/17/2018</a:t>
+              <a:t>1/10/2022</a:t>
             </a:fld>
             <a:endParaRPr lang="en-US"/>
           </a:p>
@@ -1152,7 +1152,7 @@
           <a:p>
             <a:fld id="{68C76F78-8F9A-44AD-9F58-46EB1BE74AE2}" type="datetimeFigureOut">
               <a:rPr lang="en-US" smtClean="0"/>
-              <a:t>9/17/2018</a:t>
+              <a:t>1/10/2022</a:t>
             </a:fld>
             <a:endParaRPr lang="en-US"/>
           </a:p>
@@ -1417,7 +1417,7 @@
           <a:p>
             <a:fld id="{68C76F78-8F9A-44AD-9F58-46EB1BE74AE2}" type="datetimeFigureOut">
               <a:rPr lang="en-US" smtClean="0"/>
-              <a:t>9/17/2018</a:t>
+              <a:t>1/10/2022</a:t>
             </a:fld>
             <a:endParaRPr lang="en-US"/>
           </a:p>
@@ -1829,7 +1829,7 @@
           <a:p>
             <a:fld id="{68C76F78-8F9A-44AD-9F58-46EB1BE74AE2}" type="datetimeFigureOut">
               <a:rPr lang="en-US" smtClean="0"/>
-              <a:t>9/17/2018</a:t>
+              <a:t>1/10/2022</a:t>
             </a:fld>
             <a:endParaRPr lang="en-US"/>
           </a:p>
@@ -1970,7 +1970,7 @@
           <a:p>
             <a:fld id="{68C76F78-8F9A-44AD-9F58-46EB1BE74AE2}" type="datetimeFigureOut">
               <a:rPr lang="en-US" smtClean="0"/>
-              <a:t>9/17/2018</a:t>
+              <a:t>1/10/2022</a:t>
             </a:fld>
             <a:endParaRPr lang="en-US"/>
           </a:p>
@@ -2083,7 +2083,7 @@
           <a:p>
             <a:fld id="{68C76F78-8F9A-44AD-9F58-46EB1BE74AE2}" type="datetimeFigureOut">
               <a:rPr lang="en-US" smtClean="0"/>
-              <a:t>9/17/2018</a:t>
+              <a:t>1/10/2022</a:t>
             </a:fld>
             <a:endParaRPr lang="en-US"/>
           </a:p>
@@ -2394,7 +2394,7 @@
           <a:p>
             <a:fld id="{68C76F78-8F9A-44AD-9F58-46EB1BE74AE2}" type="datetimeFigureOut">
               <a:rPr lang="en-US" smtClean="0"/>
-              <a:t>9/17/2018</a:t>
+              <a:t>1/10/2022</a:t>
             </a:fld>
             <a:endParaRPr lang="en-US"/>
           </a:p>
@@ -2682,7 +2682,7 @@
           <a:p>
             <a:fld id="{68C76F78-8F9A-44AD-9F58-46EB1BE74AE2}" type="datetimeFigureOut">
               <a:rPr lang="en-US" smtClean="0"/>
-              <a:t>9/17/2018</a:t>
+              <a:t>1/10/2022</a:t>
             </a:fld>
             <a:endParaRPr lang="en-US"/>
           </a:p>
@@ -2923,7 +2923,7 @@
           <a:p>
             <a:fld id="{68C76F78-8F9A-44AD-9F58-46EB1BE74AE2}" type="datetimeFigureOut">
               <a:rPr lang="en-US" smtClean="0"/>
-              <a:t>9/17/2018</a:t>
+              <a:t>1/10/2022</a:t>
             </a:fld>
             <a:endParaRPr lang="en-US"/>
           </a:p>
@@ -3391,23 +3391,20 @@
           <a:p>
             <a:r>
               <a:rPr lang="en-US" dirty="0"/>
-              <a:t>John C. </a:t>
-            </a:r>
-            <a:r>
-              <a:rPr lang="en-US" dirty="0" smtClean="0"/>
-              <a:t>Checco</a:t>
-            </a:r>
-          </a:p>
-          <a:p>
-            <a:r>
-              <a:rPr lang="en-US" dirty="0" smtClean="0"/>
-              <a:t>Rev B. </a:t>
-            </a:r>
-            <a:r>
-              <a:rPr lang="en-US" smtClean="0"/>
-              <a:t>2018-09-17</a:t>
-            </a:r>
-            <a:endParaRPr lang="en-US" dirty="0"/>
+              <a:t>John C. Checco</a:t>
+            </a:r>
+          </a:p>
+          <a:p>
+            <a:r>
+              <a:rPr lang="en-US" dirty="0"/>
+              <a:t>Rev 1.3.* </a:t>
+            </a:r>
+          </a:p>
+          <a:p>
+            <a:r>
+              <a:rPr lang="en-US" dirty="0"/>
+              <a:t>2022-01-10</a:t>
+            </a:r>
           </a:p>
         </p:txBody>
       </p:sp>
@@ -3537,25 +3534,20 @@
           <a:p>
             <a:r>
               <a:rPr lang="en-US" dirty="0"/>
-              <a:t>Email Checks (mailto</a:t>
-            </a:r>
-            <a:r>
-              <a:rPr lang="en-US" dirty="0" smtClean="0"/>
-              <a:t>:)</a:t>
-            </a:r>
-          </a:p>
-          <a:p>
-            <a:r>
-              <a:rPr lang="en-US" dirty="0" smtClean="0"/>
+              <a:t>Email Checks (mailto:)</a:t>
+            </a:r>
+          </a:p>
+          <a:p>
+            <a:r>
+              <a:rPr lang="en-US" dirty="0"/>
               <a:t>URLs using explicit IP addresses</a:t>
             </a:r>
           </a:p>
           <a:p>
             <a:r>
-              <a:rPr lang="en-US" dirty="0" smtClean="0"/>
+              <a:rPr lang="en-US" dirty="0"/>
               <a:t>URLs referencing local filesystem</a:t>
             </a:r>
-            <a:endParaRPr lang="en-US" dirty="0"/>
           </a:p>
           <a:p>
             <a:endParaRPr lang="en-US" dirty="0"/>
@@ -3816,6 +3808,12 @@
             </a:r>
           </a:p>
           <a:p>
+            <a:r>
+              <a:rPr lang="en-US" dirty="0"/>
+              <a:t>MIME Multipart Content-Type == Binary signature</a:t>
+            </a:r>
+          </a:p>
+          <a:p>
             <a:endParaRPr lang="en-US" dirty="0"/>
           </a:p>
           <a:p>
@@ -3826,13 +3824,6 @@
                 </a:solidFill>
               </a:rPr>
               <a:t>To Do:</a:t>
-            </a:r>
-          </a:p>
-          <a:p>
-            <a:pPr lvl="1"/>
-            <a:r>
-              <a:rPr lang="en-US" dirty="0"/>
-              <a:t>MIME Multipart Content-Type == Binary signature</a:t>
             </a:r>
           </a:p>
           <a:p>
@@ -4138,19 +4129,21 @@
           <a:lstStyle/>
           <a:p>
             <a:r>
+              <a:rPr lang="en-US" dirty="0"/>
+              <a:t>Beaconing (0px)</a:t>
+            </a:r>
+          </a:p>
+          <a:p>
+            <a:endParaRPr lang="en-US" dirty="0"/>
+          </a:p>
+          <a:p>
+            <a:r>
               <a:rPr lang="en-US" dirty="0">
                 <a:solidFill>
                   <a:srgbClr val="FF0000"/>
                 </a:solidFill>
               </a:rPr>
               <a:t>To Do</a:t>
-            </a:r>
-          </a:p>
-          <a:p>
-            <a:pPr lvl="1"/>
-            <a:r>
-              <a:rPr lang="en-US" dirty="0"/>
-              <a:t>Beaconing (0px)</a:t>
             </a:r>
           </a:p>
           <a:p>
@@ -4264,10 +4257,15 @@
             <p:ph idx="1"/>
           </p:nvPr>
         </p:nvSpPr>
-        <p:spPr/>
+        <p:spPr>
+          <a:xfrm>
+            <a:off x="838200" y="1690688"/>
+            <a:ext cx="10515600" cy="4684712"/>
+          </a:xfrm>
+        </p:spPr>
         <p:txBody>
           <a:bodyPr>
-            <a:normAutofit fontScale="77500" lnSpcReduction="20000"/>
+            <a:normAutofit fontScale="62500" lnSpcReduction="20000"/>
           </a:bodyPr>
           <a:lstStyle/>
           <a:p>
@@ -4295,6 +4293,74 @@
             <a:r>
               <a:rPr lang="en-US" dirty="0"/>
               <a:t>Plain Text (Maximum Difficulty)</a:t>
+            </a:r>
+          </a:p>
+          <a:p>
+            <a:r>
+              <a:rPr lang="en-US" dirty="0"/>
+              <a:t>Parsing for Hidden Data/Text in HTML/CSS</a:t>
+            </a:r>
+          </a:p>
+          <a:p>
+            <a:pPr lvl="1"/>
+            <a:r>
+              <a:rPr lang="en-US" dirty="0"/>
+              <a:t>Invisible Font</a:t>
+            </a:r>
+          </a:p>
+          <a:p>
+            <a:pPr lvl="1"/>
+            <a:r>
+              <a:rPr lang="en-US" dirty="0"/>
+              <a:t>0-sized elements</a:t>
+            </a:r>
+          </a:p>
+          <a:p>
+            <a:pPr lvl="1"/>
+            <a:r>
+              <a:rPr lang="en-US" dirty="0"/>
+              <a:t>Fragmented Data (intertwined with RTF/HTML comments)</a:t>
+            </a:r>
+          </a:p>
+          <a:p>
+            <a:r>
+              <a:rPr lang="en-US" dirty="0"/>
+              <a:t>External object identification/inspection</a:t>
+            </a:r>
+          </a:p>
+          <a:p>
+            <a:pPr lvl="1"/>
+            <a:r>
+              <a:rPr lang="en-US" dirty="0"/>
+              <a:t>&lt;IFRAME&gt;, &lt;OBJECT&gt;, &lt;EMBED&gt;, &lt;APPLET&gt;, &lt;IMG&gt;, &lt;A&gt;</a:t>
+            </a:r>
+          </a:p>
+          <a:p>
+            <a:r>
+              <a:rPr lang="en-US" dirty="0"/>
+              <a:t>Non-standard content:</a:t>
+            </a:r>
+          </a:p>
+          <a:p>
+            <a:pPr lvl="1"/>
+            <a:r>
+              <a:rPr lang="en-US" dirty="0"/>
+              <a:t>IDN, </a:t>
+            </a:r>
+            <a:r>
+              <a:rPr lang="en-US" dirty="0" err="1"/>
+              <a:t>PUNYcode</a:t>
+            </a:r>
+            <a:r>
+              <a:rPr lang="en-US" dirty="0"/>
+              <a:t>, non-ASCII charsets</a:t>
+            </a:r>
+          </a:p>
+          <a:p>
+            <a:pPr lvl="1"/>
+            <a:r>
+              <a:rPr lang="en-US" dirty="0"/>
+              <a:t>L33Tspeak (best guess)</a:t>
             </a:r>
           </a:p>
           <a:p>
@@ -4314,53 +4380,11 @@
             <a:pPr lvl="1"/>
             <a:r>
               <a:rPr lang="en-US" dirty="0"/>
-              <a:t>Ensuring Alternative Text == RTF/HTML</a:t>
+              <a:t>Parsing Multipart Messages (non-Attachments)</a:t>
             </a:r>
           </a:p>
           <a:p>
             <a:pPr lvl="1"/>
-            <a:r>
-              <a:rPr lang="en-US" dirty="0"/>
-              <a:t>Parsing Multipart Messages (non-Attachments)</a:t>
-            </a:r>
-          </a:p>
-          <a:p>
-            <a:pPr lvl="1"/>
-            <a:r>
-              <a:rPr lang="en-US" dirty="0"/>
-              <a:t>Parsing for Hidden Data/Text </a:t>
-            </a:r>
-          </a:p>
-          <a:p>
-            <a:pPr lvl="2"/>
-            <a:r>
-              <a:rPr lang="en-US" dirty="0"/>
-              <a:t>Invisible Font</a:t>
-            </a:r>
-          </a:p>
-          <a:p>
-            <a:pPr lvl="2"/>
-            <a:r>
-              <a:rPr lang="en-US" dirty="0"/>
-              <a:t>0-width characters</a:t>
-            </a:r>
-          </a:p>
-          <a:p>
-            <a:pPr lvl="2"/>
-            <a:r>
-              <a:rPr lang="en-US" dirty="0"/>
-              <a:t>Fragmented Data (intertwined with RTF/HTML comments)</a:t>
-            </a:r>
-          </a:p>
-          <a:p>
-            <a:pPr lvl="1"/>
-            <a:r>
-              <a:rPr lang="en-US" dirty="0"/>
-              <a:t>Advanced HTML/RTF checks: </a:t>
-            </a:r>
-          </a:p>
-          <a:p>
-            <a:pPr lvl="2"/>
             <a:r>
               <a:rPr lang="en-US" dirty="0" err="1"/>
               <a:t>Javascript</a:t>
@@ -4381,24 +4405,11 @@
             </a:r>
           </a:p>
           <a:p>
-            <a:pPr lvl="2"/>
-            <a:r>
-              <a:rPr lang="en-US" dirty="0"/>
-              <a:t>&lt;IFRAME&gt; identification/inspection</a:t>
-            </a:r>
-          </a:p>
-          <a:p>
-            <a:pPr lvl="2"/>
-            <a:r>
-              <a:rPr lang="en-US" dirty="0"/>
-              <a:t>OLE inspection</a:t>
-            </a:r>
-          </a:p>
-          <a:p>
-            <a:pPr marL="457200" lvl="1" indent="0">
-              <a:buNone/>
-            </a:pPr>
-            <a:endParaRPr lang="en-US" dirty="0"/>
+            <a:pPr lvl="1"/>
+            <a:r>
+              <a:rPr lang="en-US" dirty="0"/>
+              <a:t>Codepages</a:t>
+            </a:r>
           </a:p>
         </p:txBody>
       </p:sp>
@@ -4517,48 +4528,41 @@
         </p:spPr>
         <p:txBody>
           <a:bodyPr>
-            <a:normAutofit fontScale="92500" lnSpcReduction="10000"/>
+            <a:normAutofit fontScale="77500" lnSpcReduction="20000"/>
           </a:bodyPr>
           <a:lstStyle/>
           <a:p>
             <a:r>
               <a:rPr lang="en-US" dirty="0"/>
-              <a:t>IDN masquerading</a:t>
-            </a:r>
-          </a:p>
-          <a:p>
-            <a:r>
-              <a:rPr lang="en-US" dirty="0"/>
-              <a:t>WHOIS lookup (port 43)</a:t>
-            </a:r>
-          </a:p>
-          <a:p>
-            <a:pPr lvl="1"/>
-            <a:r>
-              <a:rPr lang="en-US" dirty="0"/>
-              <a:t>Owner Blacklist</a:t>
-            </a:r>
-          </a:p>
-          <a:p>
-            <a:r>
-              <a:rPr lang="en-US" dirty="0"/>
-              <a:t>DNS Blacklist (</a:t>
+              <a:t>IDN/</a:t>
             </a:r>
             <a:r>
               <a:rPr lang="en-US" dirty="0" err="1"/>
-              <a:t>SpamHaus</a:t>
-            </a:r>
-            <a:r>
-              <a:rPr lang="en-US" dirty="0"/>
-              <a:t>, </a:t>
-            </a:r>
-            <a:r>
-              <a:rPr lang="en-US" dirty="0" err="1"/>
-              <a:t>etc</a:t>
-            </a:r>
-            <a:r>
-              <a:rPr lang="en-US" dirty="0"/>
-              <a:t>)</a:t>
+              <a:t>PUNYcode</a:t>
+            </a:r>
+            <a:r>
+              <a:rPr lang="en-US" dirty="0"/>
+              <a:t> masquerading</a:t>
+            </a:r>
+          </a:p>
+          <a:p>
+            <a:r>
+              <a:rPr lang="en-US" dirty="0"/>
+              <a:t>WHOIS </a:t>
+            </a:r>
+            <a:r>
+              <a:rPr lang="en-US"/>
+              <a:t>lookup </a:t>
+            </a:r>
+          </a:p>
+          <a:p>
+            <a:r>
+              <a:rPr lang="en-US"/>
+              <a:t>DNS </a:t>
+            </a:r>
+            <a:r>
+              <a:rPr lang="en-US" dirty="0"/>
+              <a:t>Blacklist </a:t>
             </a:r>
           </a:p>
           <a:p>
@@ -4753,7 +4757,7 @@
               <a:rPr lang="en-US" dirty="0">
                 <a:sym typeface="Wingdings" panose="05000000000000000000" pitchFamily="2" charset="2"/>
               </a:rPr>
-              <a:t>Finger verification</a:t>
+              <a:t>Dig/Finger verification</a:t>
             </a:r>
           </a:p>
         </p:txBody>
@@ -5679,6 +5683,28 @@
             </a:r>
           </a:p>
           <a:p>
+            <a:r>
+              <a:rPr lang="en-US" dirty="0"/>
+              <a:t>Verify </a:t>
+            </a:r>
+            <a:r>
+              <a:rPr lang="en-US" dirty="0" err="1"/>
+              <a:t>Host</a:t>
+            </a:r>
+            <a:r>
+              <a:rPr lang="en-US" dirty="0" err="1">
+                <a:sym typeface="Wingdings" panose="05000000000000000000" pitchFamily="2" charset="2"/>
+              </a:rPr>
+              <a:t>IP</a:t>
+            </a:r>
+            <a:r>
+              <a:rPr lang="en-US" dirty="0">
+                <a:sym typeface="Wingdings" panose="05000000000000000000" pitchFamily="2" charset="2"/>
+              </a:rPr>
+              <a:t> mapping (From/By parts)</a:t>
+            </a:r>
+          </a:p>
+          <a:p>
             <a:endParaRPr lang="en-US" dirty="0"/>
           </a:p>
           <a:p>
@@ -5689,29 +5715,6 @@
                 </a:solidFill>
               </a:rPr>
               <a:t>To Do:</a:t>
-            </a:r>
-          </a:p>
-          <a:p>
-            <a:pPr lvl="1"/>
-            <a:r>
-              <a:rPr lang="en-US" dirty="0"/>
-              <a:t>Verify </a:t>
-            </a:r>
-            <a:r>
-              <a:rPr lang="en-US" dirty="0" err="1"/>
-              <a:t>Host</a:t>
-            </a:r>
-            <a:r>
-              <a:rPr lang="en-US" dirty="0" err="1">
-                <a:sym typeface="Wingdings" panose="05000000000000000000" pitchFamily="2" charset="2"/>
-              </a:rPr>
-              <a:t>IP</a:t>
-            </a:r>
-            <a:r>
-              <a:rPr lang="en-US" dirty="0">
-                <a:sym typeface="Wingdings" panose="05000000000000000000" pitchFamily="2" charset="2"/>
-              </a:rPr>
-              <a:t> mapping (From/By parts)</a:t>
             </a:r>
           </a:p>
           <a:p>

</xml_diff>

<commit_message>
added whitelist/checks for mimetype, codepage, culture
</commit_message>
<xml_diff>
--- a/Outlook Safety Check.pptx
+++ b/Outlook Safety Check.pptx
@@ -273,7 +273,7 @@
           <a:p>
             <a:fld id="{68C76F78-8F9A-44AD-9F58-46EB1BE74AE2}" type="datetimeFigureOut">
               <a:rPr lang="en-US" smtClean="0"/>
-              <a:t>1/10/2022</a:t>
+              <a:t>1/12/2022</a:t>
             </a:fld>
             <a:endParaRPr lang="en-US"/>
           </a:p>
@@ -471,7 +471,7 @@
           <a:p>
             <a:fld id="{68C76F78-8F9A-44AD-9F58-46EB1BE74AE2}" type="datetimeFigureOut">
               <a:rPr lang="en-US" smtClean="0"/>
-              <a:t>1/10/2022</a:t>
+              <a:t>1/12/2022</a:t>
             </a:fld>
             <a:endParaRPr lang="en-US"/>
           </a:p>
@@ -679,7 +679,7 @@
           <a:p>
             <a:fld id="{68C76F78-8F9A-44AD-9F58-46EB1BE74AE2}" type="datetimeFigureOut">
               <a:rPr lang="en-US" smtClean="0"/>
-              <a:t>1/10/2022</a:t>
+              <a:t>1/12/2022</a:t>
             </a:fld>
             <a:endParaRPr lang="en-US"/>
           </a:p>
@@ -877,7 +877,7 @@
           <a:p>
             <a:fld id="{68C76F78-8F9A-44AD-9F58-46EB1BE74AE2}" type="datetimeFigureOut">
               <a:rPr lang="en-US" smtClean="0"/>
-              <a:t>1/10/2022</a:t>
+              <a:t>1/12/2022</a:t>
             </a:fld>
             <a:endParaRPr lang="en-US"/>
           </a:p>
@@ -1152,7 +1152,7 @@
           <a:p>
             <a:fld id="{68C76F78-8F9A-44AD-9F58-46EB1BE74AE2}" type="datetimeFigureOut">
               <a:rPr lang="en-US" smtClean="0"/>
-              <a:t>1/10/2022</a:t>
+              <a:t>1/12/2022</a:t>
             </a:fld>
             <a:endParaRPr lang="en-US"/>
           </a:p>
@@ -1417,7 +1417,7 @@
           <a:p>
             <a:fld id="{68C76F78-8F9A-44AD-9F58-46EB1BE74AE2}" type="datetimeFigureOut">
               <a:rPr lang="en-US" smtClean="0"/>
-              <a:t>1/10/2022</a:t>
+              <a:t>1/12/2022</a:t>
             </a:fld>
             <a:endParaRPr lang="en-US"/>
           </a:p>
@@ -1829,7 +1829,7 @@
           <a:p>
             <a:fld id="{68C76F78-8F9A-44AD-9F58-46EB1BE74AE2}" type="datetimeFigureOut">
               <a:rPr lang="en-US" smtClean="0"/>
-              <a:t>1/10/2022</a:t>
+              <a:t>1/12/2022</a:t>
             </a:fld>
             <a:endParaRPr lang="en-US"/>
           </a:p>
@@ -1970,7 +1970,7 @@
           <a:p>
             <a:fld id="{68C76F78-8F9A-44AD-9F58-46EB1BE74AE2}" type="datetimeFigureOut">
               <a:rPr lang="en-US" smtClean="0"/>
-              <a:t>1/10/2022</a:t>
+              <a:t>1/12/2022</a:t>
             </a:fld>
             <a:endParaRPr lang="en-US"/>
           </a:p>
@@ -2083,7 +2083,7 @@
           <a:p>
             <a:fld id="{68C76F78-8F9A-44AD-9F58-46EB1BE74AE2}" type="datetimeFigureOut">
               <a:rPr lang="en-US" smtClean="0"/>
-              <a:t>1/10/2022</a:t>
+              <a:t>1/12/2022</a:t>
             </a:fld>
             <a:endParaRPr lang="en-US"/>
           </a:p>
@@ -2394,7 +2394,7 @@
           <a:p>
             <a:fld id="{68C76F78-8F9A-44AD-9F58-46EB1BE74AE2}" type="datetimeFigureOut">
               <a:rPr lang="en-US" smtClean="0"/>
-              <a:t>1/10/2022</a:t>
+              <a:t>1/12/2022</a:t>
             </a:fld>
             <a:endParaRPr lang="en-US"/>
           </a:p>
@@ -2682,7 +2682,7 @@
           <a:p>
             <a:fld id="{68C76F78-8F9A-44AD-9F58-46EB1BE74AE2}" type="datetimeFigureOut">
               <a:rPr lang="en-US" smtClean="0"/>
-              <a:t>1/10/2022</a:t>
+              <a:t>1/12/2022</a:t>
             </a:fld>
             <a:endParaRPr lang="en-US"/>
           </a:p>
@@ -2923,7 +2923,7 @@
           <a:p>
             <a:fld id="{68C76F78-8F9A-44AD-9F58-46EB1BE74AE2}" type="datetimeFigureOut">
               <a:rPr lang="en-US" smtClean="0"/>
-              <a:t>1/10/2022</a:t>
+              <a:t>1/12/2022</a:t>
             </a:fld>
             <a:endParaRPr lang="en-US"/>
           </a:p>
@@ -3403,7 +3403,7 @@
           <a:p>
             <a:r>
               <a:rPr lang="en-US" dirty="0"/>
-              <a:t>2022-01-10</a:t>
+              <a:t>2022-01-12</a:t>
             </a:r>
           </a:p>
         </p:txBody>
@@ -3479,13 +3479,13 @@
             <a:spLocks noGrp="1"/>
           </p:cNvSpPr>
           <p:nvPr>
-            <p:ph idx="1"/>
+            <p:ph sz="half" idx="1"/>
           </p:nvPr>
         </p:nvSpPr>
         <p:spPr/>
         <p:txBody>
           <a:bodyPr>
-            <a:normAutofit fontScale="85000" lnSpcReduction="20000"/>
+            <a:normAutofit lnSpcReduction="10000"/>
           </a:bodyPr>
           <a:lstStyle/>
           <a:p>
@@ -3552,6 +3552,34 @@
           <a:p>
             <a:endParaRPr lang="en-US" dirty="0"/>
           </a:p>
+          <a:p>
+            <a:pPr lvl="1"/>
+            <a:endParaRPr lang="en-US" dirty="0"/>
+          </a:p>
+        </p:txBody>
+      </p:sp>
+      <p:sp>
+        <p:nvSpPr>
+          <p:cNvPr id="4" name="Content Placeholder 3">
+            <a:extLst>
+              <a:ext uri="{FF2B5EF4-FFF2-40B4-BE49-F238E27FC236}">
+                <a16:creationId xmlns:a16="http://schemas.microsoft.com/office/drawing/2014/main" id="{81F56940-D808-4715-94B8-FB26D3AB3787}"/>
+              </a:ext>
+            </a:extLst>
+          </p:cNvPr>
+          <p:cNvSpPr>
+            <a:spLocks noGrp="1"/>
+          </p:cNvSpPr>
+          <p:nvPr>
+            <p:ph sz="half" idx="2"/>
+          </p:nvPr>
+        </p:nvSpPr>
+        <p:spPr/>
+        <p:txBody>
+          <a:bodyPr>
+            <a:normAutofit lnSpcReduction="10000"/>
+          </a:bodyPr>
+          <a:lstStyle/>
           <a:p>
             <a:r>
               <a:rPr lang="en-US" dirty="0">
@@ -3594,7 +3622,6 @@
             </a:r>
           </a:p>
           <a:p>
-            <a:pPr lvl="1"/>
             <a:endParaRPr lang="en-US" dirty="0"/>
           </a:p>
         </p:txBody>
@@ -3780,12 +3807,14 @@
             <a:spLocks noGrp="1"/>
           </p:cNvSpPr>
           <p:nvPr>
-            <p:ph idx="1"/>
+            <p:ph sz="half" idx="1"/>
           </p:nvPr>
         </p:nvSpPr>
         <p:spPr/>
         <p:txBody>
-          <a:bodyPr/>
+          <a:bodyPr>
+            <a:normAutofit/>
+          </a:bodyPr>
           <a:lstStyle/>
           <a:p>
             <a:r>
@@ -3816,6 +3845,34 @@
           <a:p>
             <a:endParaRPr lang="en-US" dirty="0"/>
           </a:p>
+          <a:p>
+            <a:pPr lvl="1"/>
+            <a:endParaRPr lang="en-US" dirty="0"/>
+          </a:p>
+        </p:txBody>
+      </p:sp>
+      <p:sp>
+        <p:nvSpPr>
+          <p:cNvPr id="4" name="Content Placeholder 3">
+            <a:extLst>
+              <a:ext uri="{FF2B5EF4-FFF2-40B4-BE49-F238E27FC236}">
+                <a16:creationId xmlns:a16="http://schemas.microsoft.com/office/drawing/2014/main" id="{1F9DCC8D-0763-42BF-8154-2B59625F0509}"/>
+              </a:ext>
+            </a:extLst>
+          </p:cNvPr>
+          <p:cNvSpPr>
+            <a:spLocks noGrp="1"/>
+          </p:cNvSpPr>
+          <p:nvPr>
+            <p:ph sz="half" idx="2"/>
+          </p:nvPr>
+        </p:nvSpPr>
+        <p:spPr/>
+        <p:txBody>
+          <a:bodyPr>
+            <a:normAutofit/>
+          </a:bodyPr>
+          <a:lstStyle/>
           <a:p>
             <a:r>
               <a:rPr lang="en-US" dirty="0">
@@ -3855,7 +3912,6 @@
             </a:r>
           </a:p>
           <a:p>
-            <a:pPr lvl="1"/>
             <a:endParaRPr lang="en-US" dirty="0"/>
           </a:p>
         </p:txBody>
@@ -4120,7 +4176,7 @@
             <a:spLocks noGrp="1"/>
           </p:cNvSpPr>
           <p:nvPr>
-            <p:ph idx="1"/>
+            <p:ph sz="half" idx="1"/>
           </p:nvPr>
         </p:nvSpPr>
         <p:spPr/>
@@ -4134,8 +4190,37 @@
             </a:r>
           </a:p>
           <a:p>
+            <a:r>
+              <a:rPr lang="en-US" dirty="0"/>
+              <a:t>Links with Query Parameters</a:t>
+            </a:r>
+          </a:p>
+          <a:p>
+            <a:pPr lvl="1"/>
             <a:endParaRPr lang="en-US" dirty="0"/>
           </a:p>
+        </p:txBody>
+      </p:sp>
+      <p:sp>
+        <p:nvSpPr>
+          <p:cNvPr id="4" name="Content Placeholder 3">
+            <a:extLst>
+              <a:ext uri="{FF2B5EF4-FFF2-40B4-BE49-F238E27FC236}">
+                <a16:creationId xmlns:a16="http://schemas.microsoft.com/office/drawing/2014/main" id="{DBB4EE5D-4B62-43C9-A112-B41B78803A6D}"/>
+              </a:ext>
+            </a:extLst>
+          </p:cNvPr>
+          <p:cNvSpPr>
+            <a:spLocks noGrp="1"/>
+          </p:cNvSpPr>
+          <p:nvPr>
+            <p:ph sz="half" idx="2"/>
+          </p:nvPr>
+        </p:nvSpPr>
+        <p:spPr/>
+        <p:txBody>
+          <a:bodyPr/>
+          <a:lstStyle/>
           <a:p>
             <a:r>
               <a:rPr lang="en-US" dirty="0">
@@ -4178,7 +4263,6 @@
             <a:endParaRPr lang="en-US" dirty="0"/>
           </a:p>
           <a:p>
-            <a:pPr lvl="1"/>
             <a:endParaRPr lang="en-US" dirty="0"/>
           </a:p>
         </p:txBody>
@@ -4254,15 +4338,10 @@
             <a:spLocks noGrp="1"/>
           </p:cNvSpPr>
           <p:nvPr>
-            <p:ph idx="1"/>
-          </p:nvPr>
-        </p:nvSpPr>
-        <p:spPr>
-          <a:xfrm>
-            <a:off x="838200" y="1690688"/>
-            <a:ext cx="10515600" cy="4684712"/>
-          </a:xfrm>
-        </p:spPr>
+            <p:ph sz="half" idx="1"/>
+          </p:nvPr>
+        </p:nvSpPr>
+        <p:spPr/>
         <p:txBody>
           <a:bodyPr>
             <a:normAutofit fontScale="62500" lnSpcReduction="20000"/>
@@ -4353,7 +4432,15 @@
             </a:r>
             <a:r>
               <a:rPr lang="en-US" dirty="0"/>
-              <a:t>, non-ASCII charsets</a:t>
+              <a:t>, </a:t>
+            </a:r>
+            <a:r>
+              <a:rPr lang="en-US" dirty="0" err="1"/>
+              <a:t>Diacratic</a:t>
+            </a:r>
+            <a:r>
+              <a:rPr lang="en-US" dirty="0"/>
+              <a:t> and non-ASCII charsets</a:t>
             </a:r>
           </a:p>
           <a:p>
@@ -4364,8 +4451,44 @@
             </a:r>
           </a:p>
           <a:p>
+            <a:r>
+              <a:rPr lang="en-US" dirty="0"/>
+              <a:t>Codepages whitelist</a:t>
+            </a:r>
+          </a:p>
+          <a:p>
+            <a:r>
+              <a:rPr lang="en-US" dirty="0"/>
+              <a:t>Country Language whitelist</a:t>
+            </a:r>
+          </a:p>
+          <a:p>
             <a:endParaRPr lang="en-US" dirty="0"/>
           </a:p>
+        </p:txBody>
+      </p:sp>
+      <p:sp>
+        <p:nvSpPr>
+          <p:cNvPr id="4" name="Content Placeholder 3">
+            <a:extLst>
+              <a:ext uri="{FF2B5EF4-FFF2-40B4-BE49-F238E27FC236}">
+                <a16:creationId xmlns:a16="http://schemas.microsoft.com/office/drawing/2014/main" id="{42546848-3B05-4CE7-8D2B-28B08FDF5A8E}"/>
+              </a:ext>
+            </a:extLst>
+          </p:cNvPr>
+          <p:cNvSpPr>
+            <a:spLocks noGrp="1"/>
+          </p:cNvSpPr>
+          <p:nvPr>
+            <p:ph sz="half" idx="2"/>
+          </p:nvPr>
+        </p:nvSpPr>
+        <p:spPr/>
+        <p:txBody>
+          <a:bodyPr>
+            <a:normAutofit fontScale="62500" lnSpcReduction="20000"/>
+          </a:bodyPr>
+          <a:lstStyle/>
           <a:p>
             <a:r>
               <a:rPr lang="en-US" dirty="0">
@@ -4405,11 +4528,7 @@
             </a:r>
           </a:p>
           <a:p>
-            <a:pPr lvl="1"/>
-            <a:r>
-              <a:rPr lang="en-US" dirty="0"/>
-              <a:t>Codepages</a:t>
-            </a:r>
+            <a:endParaRPr lang="en-US" dirty="0"/>
           </a:p>
         </p:txBody>
       </p:sp>
@@ -4542,27 +4661,27 @@
             </a:r>
             <a:r>
               <a:rPr lang="en-US" dirty="0"/>
+              <a:t>/</a:t>
+            </a:r>
+            <a:r>
+              <a:rPr lang="en-US" dirty="0" err="1"/>
+              <a:t>Diacratic</a:t>
+            </a:r>
+            <a:r>
+              <a:rPr lang="en-US" dirty="0"/>
               <a:t> masquerading</a:t>
             </a:r>
           </a:p>
           <a:p>
             <a:r>
               <a:rPr lang="en-US" dirty="0"/>
-              <a:t>WHOIS </a:t>
-            </a:r>
-            <a:r>
-              <a:rPr lang="en-US"/>
-              <a:t>lookup </a:t>
-            </a:r>
-          </a:p>
-          <a:p>
-            <a:r>
-              <a:rPr lang="en-US"/>
-              <a:t>DNS </a:t>
-            </a:r>
-            <a:r>
-              <a:rPr lang="en-US" dirty="0"/>
-              <a:t>Blacklist </a:t>
+              <a:t>WHOIS lookup </a:t>
+            </a:r>
+          </a:p>
+          <a:p>
+            <a:r>
+              <a:rPr lang="en-US" dirty="0"/>
+              <a:t>DNS Blacklist </a:t>
             </a:r>
           </a:p>
           <a:p>
@@ -4673,7 +4792,15 @@
           <a:p>
             <a:r>
               <a:rPr lang="en-US" dirty="0"/>
-              <a:t>IDN masquerading (User)</a:t>
+              <a:t>IDN/ </a:t>
+            </a:r>
+            <a:r>
+              <a:rPr lang="en-US" dirty="0" err="1"/>
+              <a:t>Diacratic</a:t>
+            </a:r>
+            <a:r>
+              <a:rPr lang="en-US" dirty="0"/>
+              <a:t> masquerading (User)</a:t>
             </a:r>
           </a:p>
           <a:p>
@@ -4923,7 +5050,7 @@
             <a:spLocks noGrp="1"/>
           </p:cNvSpPr>
           <p:nvPr>
-            <p:ph idx="1"/>
+            <p:ph sz="half" idx="1"/>
           </p:nvPr>
         </p:nvSpPr>
         <p:spPr/>
@@ -4939,6 +5066,31 @@
           <a:p>
             <a:endParaRPr lang="en-US" dirty="0"/>
           </a:p>
+          <a:p>
+            <a:endParaRPr lang="en-US" dirty="0"/>
+          </a:p>
+        </p:txBody>
+      </p:sp>
+      <p:sp>
+        <p:nvSpPr>
+          <p:cNvPr id="4" name="Content Placeholder 3">
+            <a:extLst>
+              <a:ext uri="{FF2B5EF4-FFF2-40B4-BE49-F238E27FC236}">
+                <a16:creationId xmlns:a16="http://schemas.microsoft.com/office/drawing/2014/main" id="{A5E103B8-7F47-4A3D-8535-20AE5B124878}"/>
+              </a:ext>
+            </a:extLst>
+          </p:cNvPr>
+          <p:cNvSpPr>
+            <a:spLocks noGrp="1"/>
+          </p:cNvSpPr>
+          <p:nvPr>
+            <p:ph sz="half" idx="2"/>
+          </p:nvPr>
+        </p:nvSpPr>
+        <p:spPr/>
+        <p:txBody>
+          <a:bodyPr/>
+          <a:lstStyle/>
           <a:p>
             <a:r>
               <a:rPr lang="en-US" dirty="0">
@@ -5124,7 +5276,7 @@
             <a:spLocks noGrp="1"/>
           </p:cNvSpPr>
           <p:nvPr>
-            <p:ph idx="1"/>
+            <p:ph sz="half" idx="1"/>
           </p:nvPr>
         </p:nvSpPr>
         <p:spPr/>
@@ -5166,9 +5318,36 @@
             </a:r>
           </a:p>
           <a:p>
+            <a:endParaRPr lang="en-US" dirty="0"/>
+          </a:p>
+          <a:p>
             <a:pPr lvl="1"/>
             <a:endParaRPr lang="en-US" dirty="0"/>
           </a:p>
+        </p:txBody>
+      </p:sp>
+      <p:sp>
+        <p:nvSpPr>
+          <p:cNvPr id="4" name="Content Placeholder 3">
+            <a:extLst>
+              <a:ext uri="{FF2B5EF4-FFF2-40B4-BE49-F238E27FC236}">
+                <a16:creationId xmlns:a16="http://schemas.microsoft.com/office/drawing/2014/main" id="{2DB0C427-0042-48FF-A27F-B2097E375794}"/>
+              </a:ext>
+            </a:extLst>
+          </p:cNvPr>
+          <p:cNvSpPr>
+            <a:spLocks noGrp="1"/>
+          </p:cNvSpPr>
+          <p:nvPr>
+            <p:ph sz="half" idx="2"/>
+          </p:nvPr>
+        </p:nvSpPr>
+        <p:spPr/>
+        <p:txBody>
+          <a:bodyPr>
+            <a:normAutofit/>
+          </a:bodyPr>
+          <a:lstStyle/>
           <a:p>
             <a:r>
               <a:rPr lang="en-US" dirty="0">
@@ -5190,10 +5369,6 @@
             <a:endParaRPr lang="en-US" dirty="0"/>
           </a:p>
           <a:p>
-            <a:endParaRPr lang="en-US" dirty="0"/>
-          </a:p>
-          <a:p>
-            <a:pPr lvl="1"/>
             <a:endParaRPr lang="en-US" dirty="0"/>
           </a:p>
         </p:txBody>
@@ -5657,7 +5832,7 @@
             <a:spLocks noGrp="1"/>
           </p:cNvSpPr>
           <p:nvPr>
-            <p:ph idx="1"/>
+            <p:ph sz="half" idx="1"/>
           </p:nvPr>
         </p:nvSpPr>
         <p:spPr/>
@@ -5707,6 +5882,32 @@
           <a:p>
             <a:endParaRPr lang="en-US" dirty="0"/>
           </a:p>
+          <a:p>
+            <a:pPr lvl="1"/>
+            <a:endParaRPr lang="en-US" dirty="0"/>
+          </a:p>
+        </p:txBody>
+      </p:sp>
+      <p:sp>
+        <p:nvSpPr>
+          <p:cNvPr id="4" name="Content Placeholder 3">
+            <a:extLst>
+              <a:ext uri="{FF2B5EF4-FFF2-40B4-BE49-F238E27FC236}">
+                <a16:creationId xmlns:a16="http://schemas.microsoft.com/office/drawing/2014/main" id="{21F51CE6-AB71-409C-9495-1911F5EE65EF}"/>
+              </a:ext>
+            </a:extLst>
+          </p:cNvPr>
+          <p:cNvSpPr>
+            <a:spLocks noGrp="1"/>
+          </p:cNvSpPr>
+          <p:nvPr>
+            <p:ph sz="half" idx="2"/>
+          </p:nvPr>
+        </p:nvSpPr>
+        <p:spPr/>
+        <p:txBody>
+          <a:bodyPr/>
+          <a:lstStyle/>
           <a:p>
             <a:r>
               <a:rPr lang="en-US" dirty="0">
@@ -5728,7 +5929,6 @@
             <a:endParaRPr lang="en-US" dirty="0"/>
           </a:p>
           <a:p>
-            <a:pPr lvl="1"/>
             <a:endParaRPr lang="en-US" dirty="0"/>
           </a:p>
         </p:txBody>

</xml_diff>